<commit_message>
Small update on HTML slides
</commit_message>
<xml_diff>
--- a/slides/02-HTML-basics.pptx
+++ b/slides/02-HTML-basics.pptx
@@ -2767,7 +2767,7 @@
         <p:spPr>
           <a:xfrm>
             <a:off x="732960" y="1000440"/>
-            <a:ext cx="7770960" cy="1468440"/>
+            <a:ext cx="7770600" cy="1468080"/>
           </a:xfrm>
           <a:prstGeom prst="rect">
             <a:avLst/>
@@ -2814,7 +2814,7 @@
         <p:spPr>
           <a:xfrm>
             <a:off x="1371600" y="3886200"/>
-            <a:ext cx="6399360" cy="1751040"/>
+            <a:ext cx="6399000" cy="1750680"/>
           </a:xfrm>
           <a:prstGeom prst="rect">
             <a:avLst/>
@@ -2862,14 +2862,14 @@
       </p:sp>
       <p:sp>
         <p:nvSpPr>
-          <p:cNvPr id="74" name="TextShape 3"/>
-          <p:cNvSpPr txBox="1"/>
+          <p:cNvPr id="74" name="CustomShape 3"/>
+          <p:cNvSpPr/>
           <p:nvPr/>
         </p:nvSpPr>
         <p:spPr>
           <a:xfrm>
             <a:off x="3017520" y="2214000"/>
-            <a:ext cx="3108240" cy="346320"/>
+            <a:ext cx="3107880" cy="345960"/>
           </a:xfrm>
           <a:prstGeom prst="rect">
             <a:avLst/>
@@ -2879,11 +2879,17 @@
             <a:noFill/>
           </a:ln>
         </p:spPr>
+        <p:style>
+          <a:lnRef idx="0"/>
+          <a:fillRef idx="0"/>
+          <a:effectRef idx="0"/>
+          <a:fontRef idx="minor"/>
+        </p:style>
         <p:txBody>
           <a:bodyPr lIns="90000" rIns="90000" tIns="45000" bIns="45000"/>
           <a:p>
             <a:r>
-              <a:rPr lang="en-US">
+              <a:rPr lang="en-US" strike="noStrike">
                 <a:latin typeface="Arial"/>
               </a:rPr>
               <a:t>HyperText Markup Language</a:t>
@@ -2950,7 +2956,7 @@
         <p:spPr>
           <a:xfrm>
             <a:off x="970200" y="1008000"/>
-            <a:ext cx="7770960" cy="1468440"/>
+            <a:ext cx="7770600" cy="1468080"/>
           </a:xfrm>
           <a:prstGeom prst="rect">
             <a:avLst/>
@@ -2990,14 +2996,14 @@
       </p:sp>
       <p:sp>
         <p:nvSpPr>
-          <p:cNvPr id="91" name="TextShape 2"/>
-          <p:cNvSpPr txBox="1"/>
+          <p:cNvPr id="91" name="CustomShape 2"/>
+          <p:cNvSpPr/>
           <p:nvPr/>
         </p:nvSpPr>
         <p:spPr>
           <a:xfrm>
             <a:off x="2651760" y="2834640"/>
-            <a:ext cx="3771000" cy="3450960"/>
+            <a:ext cx="3770640" cy="3450600"/>
           </a:xfrm>
           <a:prstGeom prst="rect">
             <a:avLst/>
@@ -3007,29 +3013,34 @@
             <a:noFill/>
           </a:ln>
         </p:spPr>
+        <p:style>
+          <a:lnRef idx="0"/>
+          <a:fillRef idx="0"/>
+          <a:effectRef idx="0"/>
+          <a:fontRef idx="minor"/>
+        </p:style>
         <p:txBody>
           <a:bodyPr lIns="90000" rIns="90000" tIns="45000" bIns="45000"/>
           <a:p>
-            <a:pPr>
-              <a:buSzPct val="45000"/>
-              <a:buFont typeface="StarSymbol"/>
-              <a:buChar char=""/>
-            </a:pPr>
-            <a:r>
-              <a:rPr lang="en-US" sz="2400">
+            <a:r>
+              <a:rPr lang="en-US" sz="2400" strike="noStrike">
                 <a:latin typeface="Arial"/>
               </a:rPr>
               <a:t>Подредени листове </a:t>
             </a:r>
-            <a:r>
-              <a:rPr lang="en-US" sz="2400">
-                <a:latin typeface="Arial"/>
-              </a:rPr>
-              <a:t>
-</a:t>
-            </a:r>
-            <a:r>
-              <a:rPr b="1" lang="en-US" sz="1600">
+            <a:endParaRPr/>
+          </a:p>
+          <a:p>
+            <a:pPr>
+              <a:lnSpc>
+                <a:spcPct val="100000"/>
+              </a:lnSpc>
+              <a:buSzPct val="45000"/>
+              <a:buFont typeface="StarSymbol"/>
+              <a:buChar char="l"/>
+            </a:pPr>
+            <a:r>
+              <a:rPr b="1" lang="en-US" sz="1600" strike="noStrike">
                 <a:latin typeface="Arial"/>
               </a:rPr>
               <a:t>&lt;OL&gt;, &lt;LI&gt;</a:t>
@@ -3038,25 +3049,32 @@
           </a:p>
           <a:p>
             <a:pPr>
-              <a:buSzPct val="45000"/>
-              <a:buFont typeface="StarSymbol"/>
-              <a:buChar char=""/>
-            </a:pPr>
-            <a:r>
-              <a:rPr lang="en-US" sz="2400">
+              <a:lnSpc>
+                <a:spcPct val="100000"/>
+              </a:lnSpc>
+              <a:buSzPct val="45000"/>
+              <a:buFont typeface="StarSymbol"/>
+              <a:buChar char="l"/>
+            </a:pPr>
+            <a:r>
+              <a:rPr lang="en-US" sz="2400" strike="noStrike">
                 <a:latin typeface="Arial"/>
               </a:rPr>
               <a:t>Неподредени листове</a:t>
             </a:r>
-            <a:r>
-              <a:rPr lang="en-US" sz="2400">
-                <a:latin typeface="Arial"/>
-              </a:rPr>
-              <a:t>
-</a:t>
-            </a:r>
-            <a:r>
-              <a:rPr lang="en-US" sz="1600">
+            <a:endParaRPr/>
+          </a:p>
+          <a:p>
+            <a:pPr>
+              <a:lnSpc>
+                <a:spcPct val="100000"/>
+              </a:lnSpc>
+              <a:buSzPct val="45000"/>
+              <a:buFont typeface="StarSymbol"/>
+              <a:buChar char="l"/>
+            </a:pPr>
+            <a:r>
+              <a:rPr lang="en-US" sz="1600" strike="noStrike">
                 <a:latin typeface="Arial"/>
               </a:rPr>
               <a:t>&lt;UL&gt;, &lt;LI&gt;</a:t>
@@ -3065,12 +3083,15 @@
           </a:p>
           <a:p>
             <a:pPr>
-              <a:buSzPct val="45000"/>
-              <a:buFont typeface="StarSymbol"/>
-              <a:buChar char=""/>
-            </a:pPr>
-            <a:r>
-              <a:rPr lang="en-US" sz="2400">
+              <a:lnSpc>
+                <a:spcPct val="100000"/>
+              </a:lnSpc>
+              <a:buSzPct val="45000"/>
+              <a:buFont typeface="StarSymbol"/>
+              <a:buChar char="l"/>
+            </a:pPr>
+            <a:r>
+              <a:rPr lang="en-US" sz="2400" strike="noStrike">
                 <a:latin typeface="Arial"/>
               </a:rPr>
               <a:t>Дефиниционни листове</a:t>
@@ -3079,12 +3100,15 @@
           </a:p>
           <a:p>
             <a:pPr>
-              <a:buSzPct val="45000"/>
-              <a:buFont typeface="StarSymbol"/>
-              <a:buChar char=""/>
-            </a:pPr>
-            <a:r>
-              <a:rPr lang="en-US" sz="1600">
+              <a:lnSpc>
+                <a:spcPct val="100000"/>
+              </a:lnSpc>
+              <a:buSzPct val="45000"/>
+              <a:buFont typeface="StarSymbol"/>
+              <a:buChar char="l"/>
+            </a:pPr>
+            <a:r>
+              <a:rPr lang="en-US" sz="1600" strike="noStrike">
                 <a:latin typeface="Arial"/>
               </a:rPr>
               <a:t>&lt;DL&gt;, &lt;DT&gt;, &lt;DD&gt;</a:t>
@@ -3093,25 +3117,32 @@
           </a:p>
           <a:p>
             <a:pPr>
-              <a:buSzPct val="45000"/>
-              <a:buFont typeface="StarSymbol"/>
-              <a:buChar char=""/>
-            </a:pPr>
-            <a:r>
-              <a:rPr lang="en-US" sz="2400">
+              <a:lnSpc>
+                <a:spcPct val="100000"/>
+              </a:lnSpc>
+              <a:buSzPct val="45000"/>
+              <a:buFont typeface="StarSymbol"/>
+              <a:buChar char="l"/>
+            </a:pPr>
+            <a:r>
+              <a:rPr lang="en-US" sz="2400" strike="noStrike">
                 <a:latin typeface="Arial"/>
               </a:rPr>
               <a:t>Текстово поле</a:t>
             </a:r>
-            <a:r>
-              <a:rPr lang="en-US" sz="2400">
-                <a:latin typeface="Arial"/>
-              </a:rPr>
-              <a:t>
-</a:t>
-            </a:r>
-            <a:r>
-              <a:rPr lang="en-US" sz="1600">
+            <a:endParaRPr/>
+          </a:p>
+          <a:p>
+            <a:pPr>
+              <a:lnSpc>
+                <a:spcPct val="100000"/>
+              </a:lnSpc>
+              <a:buSzPct val="45000"/>
+              <a:buFont typeface="StarSymbol"/>
+              <a:buChar char="l"/>
+            </a:pPr>
+            <a:r>
+              <a:rPr lang="en-US" sz="1600" strike="noStrike">
                 <a:latin typeface="Arial"/>
               </a:rPr>
               <a:t>&lt;TEXTAREA&gt;</a:t>
@@ -3120,9 +3151,9 @@
           </a:p>
           <a:p>
             <a:pPr>
-              <a:buSzPct val="45000"/>
-              <a:buFont typeface="StarSymbol"/>
-              <a:buChar char=""/>
+              <a:lnSpc>
+                <a:spcPct val="100000"/>
+              </a:lnSpc>
             </a:pPr>
             <a:endParaRPr/>
           </a:p>
@@ -3186,7 +3217,7 @@
         <p:spPr>
           <a:xfrm>
             <a:off x="969120" y="1107000"/>
-            <a:ext cx="7770960" cy="1468440"/>
+            <a:ext cx="7770600" cy="1468080"/>
           </a:xfrm>
           <a:prstGeom prst="rect">
             <a:avLst/>
@@ -3237,7 +3268,7 @@
         <p:spPr>
           <a:xfrm>
             <a:off x="2651760" y="2743200"/>
-            <a:ext cx="4297680" cy="3721320"/>
+            <a:ext cx="4297320" cy="3720960"/>
           </a:xfrm>
           <a:prstGeom prst="rect">
             <a:avLst/>
@@ -3305,7 +3336,7 @@
         <p:spPr>
           <a:xfrm>
             <a:off x="969120" y="1107000"/>
-            <a:ext cx="7770960" cy="1468440"/>
+            <a:ext cx="7770600" cy="1468080"/>
           </a:xfrm>
           <a:prstGeom prst="rect">
             <a:avLst/>
@@ -3345,14 +3376,14 @@
       </p:sp>
       <p:sp>
         <p:nvSpPr>
-          <p:cNvPr id="95" name="TextShape 2"/>
-          <p:cNvSpPr txBox="1"/>
+          <p:cNvPr id="95" name="CustomShape 2"/>
+          <p:cNvSpPr/>
           <p:nvPr/>
         </p:nvSpPr>
         <p:spPr>
           <a:xfrm>
             <a:off x="2650680" y="2933640"/>
-            <a:ext cx="5425920" cy="2733480"/>
+            <a:ext cx="5425560" cy="2733120"/>
           </a:xfrm>
           <a:prstGeom prst="rect">
             <a:avLst/>
@@ -3362,16 +3393,25 @@
             <a:noFill/>
           </a:ln>
         </p:spPr>
+        <p:style>
+          <a:lnRef idx="0"/>
+          <a:fillRef idx="0"/>
+          <a:effectRef idx="0"/>
+          <a:fontRef idx="minor"/>
+        </p:style>
         <p:txBody>
           <a:bodyPr lIns="90000" rIns="90000" tIns="45000" bIns="45000"/>
           <a:p>
             <a:pPr>
-              <a:buSzPct val="45000"/>
-              <a:buFont typeface="StarSymbol"/>
-              <a:buChar char=""/>
-            </a:pPr>
-            <a:r>
-              <a:rPr lang="en-US" sz="2400">
+              <a:lnSpc>
+                <a:spcPct val="100000"/>
+              </a:lnSpc>
+              <a:buSzPct val="45000"/>
+              <a:buFont typeface="StarSymbol"/>
+              <a:buChar char="l"/>
+            </a:pPr>
+            <a:r>
+              <a:rPr lang="en-US" sz="2400" strike="noStrike">
                 <a:latin typeface="Arial"/>
               </a:rPr>
               <a:t>Части на таблицата</a:t>
@@ -3380,12 +3420,15 @@
           </a:p>
           <a:p>
             <a:pPr>
-              <a:buSzPct val="45000"/>
-              <a:buFont typeface="StarSymbol"/>
-              <a:buChar char=""/>
-            </a:pPr>
-            <a:r>
-              <a:rPr lang="en-US" sz="2400">
+              <a:lnSpc>
+                <a:spcPct val="100000"/>
+              </a:lnSpc>
+              <a:buSzPct val="45000"/>
+              <a:buFont typeface="StarSymbol"/>
+              <a:buChar char="l"/>
+            </a:pPr>
+            <a:r>
+              <a:rPr lang="en-US" sz="2400" strike="noStrike">
                 <a:latin typeface="Arial"/>
               </a:rPr>
               <a:t>Редове и колони</a:t>
@@ -3394,12 +3437,15 @@
           </a:p>
           <a:p>
             <a:pPr>
-              <a:buSzPct val="45000"/>
-              <a:buFont typeface="StarSymbol"/>
-              <a:buChar char=""/>
-            </a:pPr>
-            <a:r>
-              <a:rPr lang="en-US" sz="2400">
+              <a:lnSpc>
+                <a:spcPct val="100000"/>
+              </a:lnSpc>
+              <a:buSzPct val="45000"/>
+              <a:buFont typeface="StarSymbol"/>
+              <a:buChar char="l"/>
+            </a:pPr>
+            <a:r>
+              <a:rPr lang="en-US" sz="2400" strike="noStrike">
                 <a:latin typeface="Arial"/>
               </a:rPr>
               <a:t>Атрибути за таблица</a:t>
@@ -3408,25 +3454,32 @@
           </a:p>
           <a:p>
             <a:pPr>
-              <a:buSzPct val="45000"/>
-              <a:buFont typeface="StarSymbol"/>
-              <a:buChar char=""/>
-            </a:pPr>
-            <a:r>
-              <a:rPr lang="en-US" sz="2400">
+              <a:lnSpc>
+                <a:spcPct val="100000"/>
+              </a:lnSpc>
+              <a:buSzPct val="45000"/>
+              <a:buFont typeface="StarSymbol"/>
+              <a:buChar char="l"/>
+            </a:pPr>
+            <a:r>
+              <a:rPr lang="en-US" sz="2400" strike="noStrike">
                 <a:latin typeface="Arial"/>
               </a:rPr>
               <a:t>Избягвайте да използвате таблици </a:t>
             </a:r>
-            <a:r>
-              <a:rPr lang="en-US" sz="2400">
-                <a:latin typeface="Arial"/>
-              </a:rPr>
-              <a:t>
-</a:t>
-            </a:r>
-            <a:r>
-              <a:rPr lang="en-US" sz="2400">
+            <a:endParaRPr/>
+          </a:p>
+          <a:p>
+            <a:pPr>
+              <a:lnSpc>
+                <a:spcPct val="100000"/>
+              </a:lnSpc>
+              <a:buSzPct val="45000"/>
+              <a:buFont typeface="StarSymbol"/>
+              <a:buChar char="l"/>
+            </a:pPr>
+            <a:r>
+              <a:rPr lang="en-US" sz="2400" strike="noStrike">
                 <a:latin typeface="Arial"/>
               </a:rPr>
               <a:t>за структура на страницата</a:t>
@@ -3435,9 +3488,9 @@
           </a:p>
           <a:p>
             <a:pPr>
-              <a:buSzPct val="45000"/>
-              <a:buFont typeface="StarSymbol"/>
-              <a:buChar char=""/>
+              <a:lnSpc>
+                <a:spcPct val="100000"/>
+              </a:lnSpc>
             </a:pPr>
             <a:endParaRPr/>
           </a:p>
@@ -3501,7 +3554,7 @@
         <p:spPr>
           <a:xfrm>
             <a:off x="1007280" y="769680"/>
-            <a:ext cx="7770960" cy="1468440"/>
+            <a:ext cx="7770600" cy="1468080"/>
           </a:xfrm>
           <a:prstGeom prst="rect">
             <a:avLst/>
@@ -3552,7 +3605,7 @@
         <p:spPr>
           <a:xfrm>
             <a:off x="1530360" y="2601000"/>
-            <a:ext cx="6136920" cy="3068280"/>
+            <a:ext cx="6136560" cy="3067920"/>
           </a:xfrm>
           <a:prstGeom prst="rect">
             <a:avLst/>
@@ -3624,7 +3677,7 @@
         <p:spPr>
           <a:xfrm>
             <a:off x="1597680" y="2103120"/>
-            <a:ext cx="6849720" cy="4224240"/>
+            <a:ext cx="6849360" cy="4223880"/>
           </a:xfrm>
           <a:prstGeom prst="rect">
             <a:avLst/>
@@ -3636,14 +3689,14 @@
       </p:pic>
       <p:sp>
         <p:nvSpPr>
-          <p:cNvPr id="99" name="TextShape 1"/>
-          <p:cNvSpPr txBox="1"/>
+          <p:cNvPr id="99" name="CustomShape 1"/>
+          <p:cNvSpPr/>
           <p:nvPr/>
         </p:nvSpPr>
         <p:spPr>
           <a:xfrm>
             <a:off x="919440" y="822960"/>
-            <a:ext cx="7858800" cy="1395000"/>
+            <a:ext cx="7858440" cy="1394640"/>
           </a:xfrm>
           <a:prstGeom prst="rect">
             <a:avLst/>
@@ -3653,6 +3706,12 @@
             <a:noFill/>
           </a:ln>
         </p:spPr>
+        <p:style>
+          <a:lnRef idx="0"/>
+          <a:fillRef idx="0"/>
+          <a:effectRef idx="0"/>
+          <a:fontRef idx="minor"/>
+        </p:style>
         <p:txBody>
           <a:bodyPr lIns="90000" rIns="90000" tIns="45000" bIns="45000"/>
           <a:p>
@@ -3732,8 +3791,8 @@
         </p:nvSpPr>
         <p:spPr>
           <a:xfrm>
-            <a:off x="838080" y="685800"/>
-            <a:ext cx="8228160" cy="1141560"/>
+            <a:off x="692280" y="708120"/>
+            <a:ext cx="8227800" cy="1141200"/>
           </a:xfrm>
           <a:prstGeom prst="rect">
             <a:avLst/>
@@ -3752,7 +3811,7 @@
         <p:txBody>
           <a:bodyPr lIns="90000" rIns="90000" tIns="45000" bIns="45000" anchor="ctr"/>
           <a:p>
-            <a:pPr>
+            <a:pPr algn="ctr">
               <a:lnSpc>
                 <a:spcPct val="100000"/>
               </a:lnSpc>
@@ -3765,7 +3824,7 @@
                 <a:latin typeface="Calibri"/>
                 <a:ea typeface="DejaVu Sans"/>
               </a:rPr>
-              <a:t>Задачи за домашна работа</a:t>
+              <a:t>HTML5</a:t>
             </a:r>
             <a:endParaRPr/>
           </a:p>
@@ -3779,8 +3838,8 @@
         </p:nvSpPr>
         <p:spPr>
           <a:xfrm>
-            <a:off x="731520" y="1875240"/>
-            <a:ext cx="7618680" cy="4524480"/>
+            <a:off x="585720" y="1897560"/>
+            <a:ext cx="7618320" cy="4524120"/>
           </a:xfrm>
           <a:prstGeom prst="rect">
             <a:avLst/>
@@ -3799,14 +3858,14 @@
       </p:sp>
       <p:sp>
         <p:nvSpPr>
-          <p:cNvPr id="102" name="TextShape 3"/>
-          <p:cNvSpPr txBox="1"/>
+          <p:cNvPr id="102" name="CustomShape 3"/>
+          <p:cNvSpPr/>
           <p:nvPr/>
         </p:nvSpPr>
         <p:spPr>
           <a:xfrm>
-            <a:off x="974880" y="2203920"/>
-            <a:ext cx="7620480" cy="4398120"/>
+            <a:off x="1340640" y="1737360"/>
+            <a:ext cx="7620120" cy="4397760"/>
           </a:xfrm>
           <a:prstGeom prst="rect">
             <a:avLst/>
@@ -3816,98 +3875,148 @@
             <a:noFill/>
           </a:ln>
         </p:spPr>
+        <p:style>
+          <a:lnRef idx="0"/>
+          <a:fillRef idx="0"/>
+          <a:effectRef idx="0"/>
+          <a:fontRef idx="minor"/>
+        </p:style>
         <p:txBody>
           <a:bodyPr lIns="90000" rIns="90000" tIns="45000" bIns="45000"/>
           <a:p>
             <a:pPr>
-              <a:buSzPct val="45000"/>
-              <a:buFont typeface="StarSymbol"/>
-              <a:buChar char=""/>
-            </a:pPr>
-            <a:r>
-              <a:rPr lang="en-US" sz="2400">
-                <a:latin typeface="Arial"/>
-              </a:rPr>
-              <a:t>Заглавие съдържащо името ви</a:t>
-            </a:r>
-            <a:endParaRPr/>
-          </a:p>
-          <a:p>
-            <a:pPr>
-              <a:buSzPct val="45000"/>
-              <a:buFont typeface="StarSymbol"/>
-              <a:buChar char=""/>
-            </a:pPr>
-            <a:r>
-              <a:rPr lang="en-US" sz="2400">
-                <a:latin typeface="Arial"/>
-              </a:rPr>
-              <a:t>Ваша снимка по избор</a:t>
-            </a:r>
-            <a:endParaRPr/>
-          </a:p>
-          <a:p>
-            <a:pPr>
-              <a:buSzPct val="45000"/>
-              <a:buFont typeface="StarSymbol"/>
-              <a:buChar char=""/>
-            </a:pPr>
-            <a:r>
-              <a:rPr lang="en-US" sz="2400">
-                <a:latin typeface="Arial"/>
-              </a:rPr>
-              <a:t>Кратко описание/история с подзаглавие</a:t>
-            </a:r>
-            <a:endParaRPr/>
-          </a:p>
-          <a:p>
-            <a:pPr>
-              <a:buSzPct val="45000"/>
-              <a:buFont typeface="StarSymbol"/>
-              <a:buChar char=""/>
-            </a:pPr>
-            <a:r>
-              <a:rPr lang="en-US" sz="2400">
-                <a:latin typeface="Arial"/>
-              </a:rPr>
-              <a:t>Подреден списък с нещата, които обичате да правите</a:t>
-            </a:r>
-            <a:endParaRPr/>
-          </a:p>
-          <a:p>
-            <a:pPr>
-              <a:buSzPct val="45000"/>
-              <a:buFont typeface="StarSymbol"/>
-              <a:buChar char=""/>
-            </a:pPr>
-            <a:r>
-              <a:rPr lang="en-US" sz="2400">
-                <a:latin typeface="Arial"/>
-              </a:rPr>
-              <a:t>Линкове към любимите ви страници</a:t>
-            </a:r>
-            <a:endParaRPr/>
-          </a:p>
-          <a:p>
-            <a:pPr>
-              <a:buSzPct val="45000"/>
-              <a:buFont typeface="StarSymbol"/>
-              <a:buChar char=""/>
-            </a:pPr>
-            <a:r>
-              <a:rPr lang="en-US" sz="2400">
-                <a:latin typeface="Arial"/>
-              </a:rPr>
-              <a:t>Място за попълване на коментари</a:t>
-            </a:r>
-            <a:endParaRPr/>
-          </a:p>
-          <a:p>
-            <a:pPr>
-              <a:buSzPct val="45000"/>
-              <a:buFont typeface="StarSymbol"/>
-              <a:buChar char=""/>
-            </a:pPr>
+              <a:lnSpc>
+                <a:spcPct val="100000"/>
+              </a:lnSpc>
+              <a:buSzPct val="45000"/>
+              <a:buFont typeface="StarSymbol"/>
+              <a:buChar char="l"/>
+            </a:pPr>
+            <a:r>
+              <a:rPr lang="en-US" sz="2400" strike="noStrike">
+                <a:latin typeface="Arial"/>
+              </a:rPr>
+              <a:t>HTML5  разполага с тагове за най-често използваните части на сайта</a:t>
+            </a:r>
+            <a:endParaRPr/>
+          </a:p>
+          <a:p>
+            <a:pPr>
+              <a:lnSpc>
+                <a:spcPct val="100000"/>
+              </a:lnSpc>
+              <a:buSzPct val="45000"/>
+              <a:buFont typeface="StarSymbol"/>
+              <a:buChar char="l"/>
+            </a:pPr>
+            <a:r>
+              <a:rPr lang="en-US" sz="2400" strike="noStrike">
+                <a:latin typeface="Arial"/>
+              </a:rPr>
+              <a:t>&lt;HEADER&gt;</a:t>
+            </a:r>
+            <a:endParaRPr/>
+          </a:p>
+          <a:p>
+            <a:pPr>
+              <a:lnSpc>
+                <a:spcPct val="100000"/>
+              </a:lnSpc>
+              <a:buSzPct val="45000"/>
+              <a:buFont typeface="StarSymbol"/>
+              <a:buChar char="l"/>
+            </a:pPr>
+            <a:r>
+              <a:rPr lang="en-US" sz="2400" strike="noStrike">
+                <a:latin typeface="Arial"/>
+              </a:rPr>
+              <a:t>&lt;NAV&gt;</a:t>
+            </a:r>
+            <a:endParaRPr/>
+          </a:p>
+          <a:p>
+            <a:pPr>
+              <a:lnSpc>
+                <a:spcPct val="100000"/>
+              </a:lnSpc>
+              <a:buSzPct val="45000"/>
+              <a:buFont typeface="StarSymbol"/>
+              <a:buChar char="l"/>
+            </a:pPr>
+            <a:r>
+              <a:rPr lang="en-US" sz="2400" strike="noStrike">
+                <a:latin typeface="Arial"/>
+              </a:rPr>
+              <a:t>&lt;SECTION&gt;</a:t>
+            </a:r>
+            <a:endParaRPr/>
+          </a:p>
+          <a:p>
+            <a:pPr>
+              <a:lnSpc>
+                <a:spcPct val="100000"/>
+              </a:lnSpc>
+              <a:buSzPct val="45000"/>
+              <a:buFont typeface="StarSymbol"/>
+              <a:buChar char="l"/>
+            </a:pPr>
+            <a:r>
+              <a:rPr lang="en-US" sz="2400" strike="noStrike">
+                <a:latin typeface="Arial"/>
+              </a:rPr>
+              <a:t>&lt;ASIDE&gt;</a:t>
+            </a:r>
+            <a:endParaRPr/>
+          </a:p>
+          <a:p>
+            <a:pPr>
+              <a:lnSpc>
+                <a:spcPct val="100000"/>
+              </a:lnSpc>
+              <a:buSzPct val="45000"/>
+              <a:buFont typeface="StarSymbol"/>
+              <a:buChar char="l"/>
+            </a:pPr>
+            <a:r>
+              <a:rPr lang="en-US" sz="2400" strike="noStrike">
+                <a:latin typeface="Arial"/>
+              </a:rPr>
+              <a:t>&lt;ARTICLE&gt;</a:t>
+            </a:r>
+            <a:endParaRPr/>
+          </a:p>
+          <a:p>
+            <a:pPr>
+              <a:lnSpc>
+                <a:spcPct val="100000"/>
+              </a:lnSpc>
+              <a:buSzPct val="45000"/>
+              <a:buFont typeface="StarSymbol"/>
+              <a:buChar char="l"/>
+            </a:pPr>
+            <a:r>
+              <a:rPr lang="en-US" sz="2400" strike="noStrike">
+                <a:latin typeface="Arial"/>
+              </a:rPr>
+              <a:t>&lt;FOOTER&gt;</a:t>
+            </a:r>
+            <a:endParaRPr/>
+          </a:p>
+          <a:p>
+            <a:pPr>
+              <a:lnSpc>
+                <a:spcPct val="100000"/>
+              </a:lnSpc>
+              <a:buSzPct val="45000"/>
+              <a:buFont typeface="StarSymbol"/>
+              <a:buChar char="l"/>
+            </a:pPr>
+            <a:r>
+              <a:rPr lang="en-US" sz="2400" strike="noStrike">
+                <a:latin typeface="Arial"/>
+              </a:rPr>
+              <a:t>Пълен списък : HTML5 тагове</a:t>
+            </a:r>
             <a:endParaRPr/>
           </a:p>
         </p:txBody>
@@ -3970,7 +4079,7 @@
         <p:spPr>
           <a:xfrm>
             <a:off x="692280" y="708120"/>
-            <a:ext cx="8228160" cy="1141560"/>
+            <a:ext cx="8227800" cy="1141200"/>
           </a:xfrm>
           <a:prstGeom prst="rect">
             <a:avLst/>
@@ -4002,7 +4111,7 @@
                 <a:latin typeface="Calibri"/>
                 <a:ea typeface="DejaVu Sans"/>
               </a:rPr>
-              <a:t>HTML5</a:t>
+              <a:t>HTML5 Демо</a:t>
             </a:r>
             <a:endParaRPr/>
           </a:p>
@@ -4017,7 +4126,7 @@
         <p:spPr>
           <a:xfrm>
             <a:off x="585720" y="1897560"/>
-            <a:ext cx="7618680" cy="4524480"/>
+            <a:ext cx="7618320" cy="4524120"/>
           </a:xfrm>
           <a:prstGeom prst="rect">
             <a:avLst/>
@@ -4034,147 +4143,29 @@
           <a:fontRef idx="minor"/>
         </p:style>
       </p:sp>
-      <p:sp>
-        <p:nvSpPr>
-          <p:cNvPr id="105" name="TextShape 3"/>
-          <p:cNvSpPr txBox="1"/>
+      <p:pic>
+        <p:nvPicPr>
+          <p:cNvPr id="105" name="Picture 2" descr=""/>
+          <p:cNvPicPr/>
           <p:nvPr/>
-        </p:nvSpPr>
-        <p:spPr>
-          <a:xfrm>
-            <a:off x="1340640" y="1737360"/>
-            <a:ext cx="7620480" cy="4398120"/>
-          </a:xfrm>
-          <a:prstGeom prst="rect">
-            <a:avLst/>
-          </a:prstGeom>
-          <a:noFill/>
+        </p:nvPicPr>
+        <p:blipFill>
+          <a:blip r:embed="rId1"/>
+          <a:stretch/>
+        </p:blipFill>
+        <p:spPr>
+          <a:xfrm>
+            <a:off x="1695600" y="1828800"/>
+            <a:ext cx="6076440" cy="4480200"/>
+          </a:xfrm>
+          <a:prstGeom prst="rect">
+            <a:avLst/>
+          </a:prstGeom>
           <a:ln>
             <a:noFill/>
           </a:ln>
         </p:spPr>
-        <p:txBody>
-          <a:bodyPr lIns="90000" rIns="90000" tIns="45000" bIns="45000"/>
-          <a:p>
-            <a:pPr>
-              <a:buSzPct val="45000"/>
-              <a:buFont typeface="StarSymbol"/>
-              <a:buChar char=""/>
-            </a:pPr>
-            <a:r>
-              <a:rPr lang="en-US" sz="2400">
-                <a:latin typeface="Arial"/>
-              </a:rPr>
-              <a:t>HTML5  разполага с тагове за най-често използваните части на сайта</a:t>
-            </a:r>
-            <a:endParaRPr/>
-          </a:p>
-          <a:p>
-            <a:pPr>
-              <a:buSzPct val="45000"/>
-              <a:buFont typeface="StarSymbol"/>
-              <a:buChar char=""/>
-            </a:pPr>
-            <a:r>
-              <a:rPr lang="en-US" sz="2400">
-                <a:latin typeface="Arial"/>
-              </a:rPr>
-              <a:t>&lt;HEADER&gt;</a:t>
-            </a:r>
-            <a:endParaRPr/>
-          </a:p>
-          <a:p>
-            <a:pPr>
-              <a:buSzPct val="45000"/>
-              <a:buFont typeface="StarSymbol"/>
-              <a:buChar char=""/>
-            </a:pPr>
-            <a:r>
-              <a:rPr lang="en-US" sz="2400">
-                <a:latin typeface="Arial"/>
-              </a:rPr>
-              <a:t>&lt;NAV&gt;</a:t>
-            </a:r>
-            <a:endParaRPr/>
-          </a:p>
-          <a:p>
-            <a:pPr>
-              <a:buSzPct val="45000"/>
-              <a:buFont typeface="StarSymbol"/>
-              <a:buChar char=""/>
-            </a:pPr>
-            <a:r>
-              <a:rPr lang="en-US" sz="2400">
-                <a:latin typeface="Arial"/>
-              </a:rPr>
-              <a:t>&lt;SECTION&gt;</a:t>
-            </a:r>
-            <a:endParaRPr/>
-          </a:p>
-          <a:p>
-            <a:pPr>
-              <a:buSzPct val="45000"/>
-              <a:buFont typeface="StarSymbol"/>
-              <a:buChar char=""/>
-            </a:pPr>
-            <a:r>
-              <a:rPr lang="en-US" sz="2400">
-                <a:latin typeface="Arial"/>
-              </a:rPr>
-              <a:t>&lt;ASIDE&gt;</a:t>
-            </a:r>
-            <a:endParaRPr/>
-          </a:p>
-          <a:p>
-            <a:pPr>
-              <a:buSzPct val="45000"/>
-              <a:buFont typeface="StarSymbol"/>
-              <a:buChar char=""/>
-            </a:pPr>
-            <a:r>
-              <a:rPr lang="en-US" sz="2400">
-                <a:latin typeface="Arial"/>
-              </a:rPr>
-              <a:t>&lt;ARTICLE&gt;</a:t>
-            </a:r>
-            <a:endParaRPr/>
-          </a:p>
-          <a:p>
-            <a:pPr>
-              <a:buSzPct val="45000"/>
-              <a:buFont typeface="StarSymbol"/>
-              <a:buChar char=""/>
-            </a:pPr>
-            <a:r>
-              <a:rPr lang="en-US" sz="2400">
-                <a:latin typeface="Arial"/>
-              </a:rPr>
-              <a:t>&lt;FOOTER&gt;</a:t>
-            </a:r>
-            <a:endParaRPr/>
-          </a:p>
-          <a:p>
-            <a:pPr>
-              <a:buSzPct val="45000"/>
-              <a:buFont typeface="StarSymbol"/>
-              <a:buChar char=""/>
-            </a:pPr>
-            <a:r>
-              <a:rPr lang="en-US" sz="2400">
-                <a:latin typeface="Arial"/>
-              </a:rPr>
-              <a:t>Пълен списък : </a:t>
-            </a:r>
-            <a:r>
-              <a:rPr lang="en-US" sz="2400">
-                <a:latin typeface="Arial"/>
-              </a:rPr>
-              <a:t>HTML5 тагове</a:t>
-            </a:r>
-            <a:endParaRPr/>
-          </a:p>
-        </p:txBody>
-      </p:sp>
+      </p:pic>
     </p:spTree>
   </p:cSld>
   <p:timing>
@@ -4232,8 +4223,8 @@
         </p:nvSpPr>
         <p:spPr>
           <a:xfrm>
-            <a:off x="692280" y="708120"/>
-            <a:ext cx="8228160" cy="1141560"/>
+            <a:off x="550080" y="687240"/>
+            <a:ext cx="8227800" cy="1141200"/>
           </a:xfrm>
           <a:prstGeom prst="rect">
             <a:avLst/>
@@ -4252,7 +4243,7 @@
         <p:txBody>
           <a:bodyPr lIns="90000" rIns="90000" tIns="45000" bIns="45000" anchor="ctr"/>
           <a:p>
-            <a:pPr algn="ctr">
+            <a:pPr>
               <a:lnSpc>
                 <a:spcPct val="100000"/>
               </a:lnSpc>
@@ -4265,7 +4256,7 @@
                 <a:latin typeface="Calibri"/>
                 <a:ea typeface="DejaVu Sans"/>
               </a:rPr>
-              <a:t>HTML5 Демо</a:t>
+              <a:t>Какво трябва да запомним</a:t>
             </a:r>
             <a:endParaRPr/>
           </a:p>
@@ -4279,8 +4270,8 @@
         </p:nvSpPr>
         <p:spPr>
           <a:xfrm>
-            <a:off x="585720" y="1897560"/>
-            <a:ext cx="7618680" cy="4524480"/>
+            <a:off x="963360" y="1947600"/>
+            <a:ext cx="7618320" cy="4524120"/>
           </a:xfrm>
           <a:prstGeom prst="rect">
             <a:avLst/>
@@ -4297,29 +4288,103 @@
           <a:fontRef idx="minor"/>
         </p:style>
       </p:sp>
-      <p:pic>
-        <p:nvPicPr>
-          <p:cNvPr id="108" name="Picture 2" descr=""/>
-          <p:cNvPicPr/>
+      <p:sp>
+        <p:nvSpPr>
+          <p:cNvPr id="108" name="CustomShape 3"/>
+          <p:cNvSpPr/>
           <p:nvPr/>
-        </p:nvPicPr>
-        <p:blipFill>
-          <a:blip r:embed="rId1"/>
-          <a:stretch/>
-        </p:blipFill>
-        <p:spPr>
-          <a:xfrm>
-            <a:off x="1695600" y="1828800"/>
-            <a:ext cx="6076800" cy="4480560"/>
-          </a:xfrm>
-          <a:prstGeom prst="rect">
-            <a:avLst/>
-          </a:prstGeom>
+        </p:nvSpPr>
+        <p:spPr>
+          <a:xfrm>
+            <a:off x="1718280" y="1787400"/>
+            <a:ext cx="7620120" cy="4397760"/>
+          </a:xfrm>
+          <a:prstGeom prst="rect">
+            <a:avLst/>
+          </a:prstGeom>
+          <a:noFill/>
           <a:ln>
             <a:noFill/>
           </a:ln>
         </p:spPr>
-      </p:pic>
+        <p:style>
+          <a:lnRef idx="0"/>
+          <a:fillRef idx="0"/>
+          <a:effectRef idx="0"/>
+          <a:fontRef idx="minor"/>
+        </p:style>
+        <p:txBody>
+          <a:bodyPr lIns="90000" rIns="90000" tIns="45000" bIns="45000"/>
+          <a:p>
+            <a:pPr>
+              <a:lnSpc>
+                <a:spcPct val="100000"/>
+              </a:lnSpc>
+              <a:buSzPct val="45000"/>
+              <a:buFont typeface="StarSymbol"/>
+              <a:buChar char="l"/>
+            </a:pPr>
+            <a:r>
+              <a:rPr lang="en-US" sz="2400" strike="noStrike">
+                <a:latin typeface="Arial"/>
+              </a:rPr>
+              <a:t>HTML изгражда структурата на една страница. Той не отговаря за дизайна</a:t>
+            </a:r>
+            <a:endParaRPr/>
+          </a:p>
+          <a:p>
+            <a:pPr>
+              <a:lnSpc>
+                <a:spcPct val="100000"/>
+              </a:lnSpc>
+              <a:buSzPct val="45000"/>
+              <a:buFont typeface="StarSymbol"/>
+              <a:buChar char="l"/>
+            </a:pPr>
+            <a:r>
+              <a:rPr lang="en-US" sz="2400" strike="noStrike">
+                <a:latin typeface="Arial"/>
+              </a:rPr>
+              <a:t>Браузърите работят с невалиден HTML. Ние не трябва да го допускаме</a:t>
+            </a:r>
+            <a:endParaRPr/>
+          </a:p>
+          <a:p>
+            <a:pPr>
+              <a:lnSpc>
+                <a:spcPct val="100000"/>
+              </a:lnSpc>
+              <a:buSzPct val="45000"/>
+              <a:buFont typeface="StarSymbol"/>
+              <a:buChar char="l"/>
+            </a:pPr>
+            <a:r>
+              <a:rPr lang="en-US" sz="2400" strike="noStrike">
+                <a:latin typeface="Arial"/>
+              </a:rPr>
+              <a:t>Винаги мислете за семантиката за частите на сайта</a:t>
+            </a:r>
+            <a:endParaRPr/>
+          </a:p>
+          <a:p>
+            <a:pPr>
+              <a:lnSpc>
+                <a:spcPct val="100000"/>
+              </a:lnSpc>
+              <a:buSzPct val="45000"/>
+              <a:buFont typeface="StarSymbol"/>
+              <a:buChar char="l"/>
+            </a:pPr>
+            <a:r>
+              <a:rPr lang="en-US" sz="2400" strike="noStrike">
+                <a:latin typeface="Arial"/>
+              </a:rPr>
+              <a:t>Валидирайте HTML-а си Online Validator</a:t>
+            </a:r>
+            <a:endParaRPr/>
+          </a:p>
+        </p:txBody>
+      </p:sp>
     </p:spTree>
   </p:cSld>
   <p:timing>
@@ -4377,8 +4442,8 @@
         </p:nvSpPr>
         <p:spPr>
           <a:xfrm>
-            <a:off x="550080" y="687240"/>
-            <a:ext cx="8228160" cy="1141560"/>
+            <a:off x="838080" y="685800"/>
+            <a:ext cx="8227800" cy="1141200"/>
           </a:xfrm>
           <a:prstGeom prst="rect">
             <a:avLst/>
@@ -4410,7 +4475,7 @@
                 <a:latin typeface="Calibri"/>
                 <a:ea typeface="DejaVu Sans"/>
               </a:rPr>
-              <a:t>Какво трябва да запомним</a:t>
+              <a:t>Задачи за домашна работа</a:t>
             </a:r>
             <a:endParaRPr/>
           </a:p>
@@ -4424,8 +4489,8 @@
         </p:nvSpPr>
         <p:spPr>
           <a:xfrm>
-            <a:off x="963360" y="1947600"/>
-            <a:ext cx="7618680" cy="4524480"/>
+            <a:off x="731520" y="1875240"/>
+            <a:ext cx="7618320" cy="4524120"/>
           </a:xfrm>
           <a:prstGeom prst="rect">
             <a:avLst/>
@@ -4444,14 +4509,14 @@
       </p:sp>
       <p:sp>
         <p:nvSpPr>
-          <p:cNvPr id="111" name="TextShape 3"/>
-          <p:cNvSpPr txBox="1"/>
+          <p:cNvPr id="111" name="CustomShape 3"/>
+          <p:cNvSpPr/>
           <p:nvPr/>
         </p:nvSpPr>
         <p:spPr>
           <a:xfrm>
-            <a:off x="1718280" y="1787400"/>
-            <a:ext cx="7620480" cy="4398120"/>
+            <a:off x="974880" y="2203920"/>
+            <a:ext cx="7620120" cy="4397760"/>
           </a:xfrm>
           <a:prstGeom prst="rect">
             <a:avLst/>
@@ -4461,68 +4526,122 @@
             <a:noFill/>
           </a:ln>
         </p:spPr>
+        <p:style>
+          <a:lnRef idx="0"/>
+          <a:fillRef idx="0"/>
+          <a:effectRef idx="0"/>
+          <a:fontRef idx="minor"/>
+        </p:style>
         <p:txBody>
           <a:bodyPr lIns="90000" rIns="90000" tIns="45000" bIns="45000"/>
           <a:p>
             <a:pPr>
-              <a:buSzPct val="45000"/>
-              <a:buFont typeface="StarSymbol"/>
-              <a:buChar char=""/>
-            </a:pPr>
-            <a:r>
-              <a:rPr lang="en-US" sz="2400">
-                <a:latin typeface="Arial"/>
-              </a:rPr>
-              <a:t>HTML изгражда структурата на една страница. Той не отговаря за дизайна</a:t>
-            </a:r>
-            <a:endParaRPr/>
-          </a:p>
-          <a:p>
-            <a:pPr>
-              <a:buSzPct val="45000"/>
-              <a:buFont typeface="StarSymbol"/>
-              <a:buChar char=""/>
-            </a:pPr>
-            <a:r>
-              <a:rPr lang="en-US" sz="2400">
-                <a:latin typeface="Arial"/>
-              </a:rPr>
-              <a:t>Браузърите работят с невалиден HTML. Ние не трябва да го допускаме</a:t>
-            </a:r>
-            <a:endParaRPr/>
-          </a:p>
-          <a:p>
-            <a:pPr>
-              <a:buSzPct val="45000"/>
-              <a:buFont typeface="StarSymbol"/>
-              <a:buChar char=""/>
-            </a:pPr>
-            <a:r>
-              <a:rPr lang="en-US" sz="2400">
-                <a:latin typeface="Arial"/>
-              </a:rPr>
-              <a:t>Винаги мислете за семантиката за частите на сайта</a:t>
-            </a:r>
-            <a:endParaRPr/>
-          </a:p>
-          <a:p>
-            <a:pPr>
-              <a:buSzPct val="45000"/>
-              <a:buFont typeface="StarSymbol"/>
-              <a:buChar char=""/>
-            </a:pPr>
-            <a:r>
-              <a:rPr lang="en-US" sz="2400">
-                <a:latin typeface="Arial"/>
-              </a:rPr>
-              <a:t>Валидирайте HTML-а си </a:t>
-            </a:r>
-            <a:r>
-              <a:rPr lang="en-US" sz="2400">
-                <a:latin typeface="Arial"/>
-              </a:rPr>
-              <a:t>Online Validator</a:t>
-            </a:r>
+              <a:lnSpc>
+                <a:spcPct val="100000"/>
+              </a:lnSpc>
+              <a:buSzPct val="45000"/>
+              <a:buFont typeface="StarSymbol"/>
+              <a:buChar char="l"/>
+            </a:pPr>
+            <a:r>
+              <a:rPr lang="en-US" sz="2400" strike="noStrike">
+                <a:latin typeface="Arial"/>
+              </a:rPr>
+              <a:t>Заглавие съдържащо името ви</a:t>
+            </a:r>
+            <a:endParaRPr/>
+          </a:p>
+          <a:p>
+            <a:pPr>
+              <a:lnSpc>
+                <a:spcPct val="100000"/>
+              </a:lnSpc>
+              <a:buSzPct val="45000"/>
+              <a:buFont typeface="StarSymbol"/>
+              <a:buChar char="l"/>
+            </a:pPr>
+            <a:r>
+              <a:rPr lang="en-US" sz="2400" strike="noStrike">
+                <a:latin typeface="Arial"/>
+              </a:rPr>
+              <a:t>Ваша снимка по избор</a:t>
+            </a:r>
+            <a:endParaRPr/>
+          </a:p>
+          <a:p>
+            <a:pPr>
+              <a:lnSpc>
+                <a:spcPct val="100000"/>
+              </a:lnSpc>
+              <a:buSzPct val="45000"/>
+              <a:buFont typeface="StarSymbol"/>
+              <a:buChar char="l"/>
+            </a:pPr>
+            <a:r>
+              <a:rPr lang="en-US" sz="2400" strike="noStrike">
+                <a:latin typeface="Arial"/>
+              </a:rPr>
+              <a:t>Кратко описание/история с подзаглавие</a:t>
+            </a:r>
+            <a:endParaRPr/>
+          </a:p>
+          <a:p>
+            <a:pPr>
+              <a:lnSpc>
+                <a:spcPct val="100000"/>
+              </a:lnSpc>
+              <a:buSzPct val="45000"/>
+              <a:buFont typeface="StarSymbol"/>
+              <a:buChar char="l"/>
+            </a:pPr>
+            <a:r>
+              <a:rPr lang="en-US" sz="2400" strike="noStrike">
+                <a:latin typeface="Arial"/>
+              </a:rPr>
+              <a:t>Подреден списък с нещата, които обичате да правите</a:t>
+            </a:r>
+            <a:endParaRPr/>
+          </a:p>
+          <a:p>
+            <a:pPr>
+              <a:lnSpc>
+                <a:spcPct val="100000"/>
+              </a:lnSpc>
+              <a:buSzPct val="45000"/>
+              <a:buFont typeface="StarSymbol"/>
+              <a:buChar char="l"/>
+            </a:pPr>
+            <a:r>
+              <a:rPr lang="en-US" sz="2400" strike="noStrike">
+                <a:latin typeface="Arial"/>
+              </a:rPr>
+              <a:t>Линкове към любимите ви страници</a:t>
+            </a:r>
+            <a:endParaRPr/>
+          </a:p>
+          <a:p>
+            <a:pPr>
+              <a:lnSpc>
+                <a:spcPct val="100000"/>
+              </a:lnSpc>
+              <a:buSzPct val="45000"/>
+              <a:buFont typeface="StarSymbol"/>
+              <a:buChar char="l"/>
+            </a:pPr>
+            <a:r>
+              <a:rPr lang="en-US" sz="2400" strike="noStrike">
+                <a:latin typeface="Arial"/>
+              </a:rPr>
+              <a:t>Място за попълване на коментари</a:t>
+            </a:r>
+            <a:endParaRPr/>
+          </a:p>
+          <a:p>
+            <a:pPr>
+              <a:lnSpc>
+                <a:spcPct val="100000"/>
+              </a:lnSpc>
+            </a:pPr>
             <a:endParaRPr/>
           </a:p>
         </p:txBody>
@@ -4585,7 +4704,7 @@
         <p:spPr>
           <a:xfrm>
             <a:off x="838080" y="685800"/>
-            <a:ext cx="8228160" cy="1141560"/>
+            <a:ext cx="8227800" cy="1141200"/>
           </a:xfrm>
           <a:prstGeom prst="rect">
             <a:avLst/>
@@ -4632,7 +4751,7 @@
         <p:spPr>
           <a:xfrm>
             <a:off x="762120" y="1676520"/>
-            <a:ext cx="7618680" cy="4524480"/>
+            <a:ext cx="7618320" cy="4524120"/>
           </a:xfrm>
           <a:prstGeom prst="rect">
             <a:avLst/>
@@ -4697,7 +4816,7 @@
         <p:spPr>
           <a:xfrm>
             <a:off x="3505320" y="2057400"/>
-            <a:ext cx="2417760" cy="2417760"/>
+            <a:ext cx="2417400" cy="2417400"/>
           </a:xfrm>
           <a:prstGeom prst="rect">
             <a:avLst/>
@@ -4765,7 +4884,7 @@
         <p:spPr>
           <a:xfrm>
             <a:off x="758520" y="1020240"/>
-            <a:ext cx="7770960" cy="1468440"/>
+            <a:ext cx="7770600" cy="1468080"/>
           </a:xfrm>
           <a:prstGeom prst="rect">
             <a:avLst/>
@@ -4805,14 +4924,14 @@
       </p:sp>
       <p:sp>
         <p:nvSpPr>
-          <p:cNvPr id="76" name="TextShape 2"/>
-          <p:cNvSpPr txBox="1"/>
+          <p:cNvPr id="76" name="CustomShape 2"/>
+          <p:cNvSpPr/>
           <p:nvPr/>
         </p:nvSpPr>
         <p:spPr>
           <a:xfrm>
             <a:off x="1675800" y="3200400"/>
-            <a:ext cx="6462360" cy="1411920"/>
+            <a:ext cx="6462000" cy="1411560"/>
           </a:xfrm>
           <a:prstGeom prst="rect">
             <a:avLst/>
@@ -4822,16 +4941,25 @@
             <a:noFill/>
           </a:ln>
         </p:spPr>
+        <p:style>
+          <a:lnRef idx="0"/>
+          <a:fillRef idx="0"/>
+          <a:effectRef idx="0"/>
+          <a:fontRef idx="minor"/>
+        </p:style>
         <p:txBody>
           <a:bodyPr lIns="90000" rIns="90000" tIns="45000" bIns="45000"/>
           <a:p>
             <a:pPr>
-              <a:buSzPct val="45000"/>
-              <a:buFont typeface="StarSymbol"/>
-              <a:buChar char=""/>
-            </a:pPr>
-            <a:r>
-              <a:rPr lang="en-US" sz="2400">
+              <a:lnSpc>
+                <a:spcPct val="100000"/>
+              </a:lnSpc>
+              <a:buSzPct val="45000"/>
+              <a:buFont typeface="StarSymbol"/>
+              <a:buChar char="l"/>
+            </a:pPr>
+            <a:r>
+              <a:rPr lang="en-US" sz="2400" strike="noStrike">
                 <a:latin typeface="Arial"/>
               </a:rPr>
               <a:t>Структурно съдържание: HTML</a:t>
@@ -4840,12 +4968,15 @@
           </a:p>
           <a:p>
             <a:pPr>
-              <a:buSzPct val="45000"/>
-              <a:buFont typeface="StarSymbol"/>
-              <a:buChar char=""/>
-            </a:pPr>
-            <a:r>
-              <a:rPr lang="en-US" sz="2400">
+              <a:lnSpc>
+                <a:spcPct val="100000"/>
+              </a:lnSpc>
+              <a:buSzPct val="45000"/>
+              <a:buFont typeface="StarSymbol"/>
+              <a:buChar char="l"/>
+            </a:pPr>
+            <a:r>
+              <a:rPr lang="en-US" sz="2400" strike="noStrike">
                 <a:latin typeface="Arial"/>
               </a:rPr>
               <a:t>Стилизиране на съдържание: CSS</a:t>
@@ -4854,12 +4985,15 @@
           </a:p>
           <a:p>
             <a:pPr>
-              <a:buSzPct val="45000"/>
-              <a:buFont typeface="StarSymbol"/>
-              <a:buChar char=""/>
-            </a:pPr>
-            <a:r>
-              <a:rPr lang="en-US" sz="2400">
+              <a:lnSpc>
+                <a:spcPct val="100000"/>
+              </a:lnSpc>
+              <a:buSzPct val="45000"/>
+              <a:buFont typeface="StarSymbol"/>
+              <a:buChar char="l"/>
+            </a:pPr>
+            <a:r>
+              <a:rPr lang="en-US" sz="2400" strike="noStrike">
                 <a:latin typeface="Arial"/>
               </a:rPr>
               <a:t>Взаимодействие с потребителя: JavaScript</a:t>
@@ -4926,7 +5060,7 @@
         <p:spPr>
           <a:xfrm>
             <a:off x="910080" y="1124280"/>
-            <a:ext cx="7770960" cy="1468440"/>
+            <a:ext cx="7770600" cy="1468080"/>
           </a:xfrm>
           <a:prstGeom prst="rect">
             <a:avLst/>
@@ -4966,14 +5100,14 @@
       </p:sp>
       <p:sp>
         <p:nvSpPr>
-          <p:cNvPr id="78" name="TextShape 2"/>
-          <p:cNvSpPr txBox="1"/>
+          <p:cNvPr id="78" name="CustomShape 2"/>
+          <p:cNvSpPr/>
           <p:nvPr/>
         </p:nvSpPr>
         <p:spPr>
           <a:xfrm>
             <a:off x="3108960" y="3291840"/>
-            <a:ext cx="3316680" cy="1901160"/>
+            <a:ext cx="3316320" cy="1900800"/>
           </a:xfrm>
           <a:prstGeom prst="rect">
             <a:avLst/>
@@ -4983,16 +5117,25 @@
             <a:noFill/>
           </a:ln>
         </p:spPr>
+        <p:style>
+          <a:lnRef idx="0"/>
+          <a:fillRef idx="0"/>
+          <a:effectRef idx="0"/>
+          <a:fontRef idx="minor"/>
+        </p:style>
         <p:txBody>
           <a:bodyPr lIns="90000" rIns="90000" tIns="45000" bIns="45000"/>
           <a:p>
             <a:pPr>
-              <a:buSzPct val="45000"/>
-              <a:buFont typeface="StarSymbol"/>
-              <a:buChar char=""/>
-            </a:pPr>
-            <a:r>
-              <a:rPr lang="en-US" sz="2400">
+              <a:lnSpc>
+                <a:spcPct val="100000"/>
+              </a:lnSpc>
+              <a:buSzPct val="45000"/>
+              <a:buFont typeface="StarSymbol"/>
+              <a:buChar char="l"/>
+            </a:pPr>
+            <a:r>
+              <a:rPr lang="en-US" sz="2400" strike="noStrike">
                 <a:latin typeface="Arial"/>
               </a:rPr>
               <a:t>Как е възникнал</a:t>
@@ -5001,12 +5144,15 @@
           </a:p>
           <a:p>
             <a:pPr>
-              <a:buSzPct val="45000"/>
-              <a:buFont typeface="StarSymbol"/>
-              <a:buChar char=""/>
-            </a:pPr>
-            <a:r>
-              <a:rPr lang="en-US" sz="2400">
+              <a:lnSpc>
+                <a:spcPct val="100000"/>
+              </a:lnSpc>
+              <a:buSzPct val="45000"/>
+              <a:buFont typeface="StarSymbol"/>
+              <a:buChar char="l"/>
+            </a:pPr>
+            <a:r>
+              <a:rPr lang="en-US" sz="2400" strike="noStrike">
                 <a:latin typeface="Arial"/>
               </a:rPr>
               <a:t>За какво служи ( UI )</a:t>
@@ -5015,12 +5161,15 @@
           </a:p>
           <a:p>
             <a:pPr>
-              <a:buSzPct val="45000"/>
-              <a:buFont typeface="StarSymbol"/>
-              <a:buChar char=""/>
-            </a:pPr>
-            <a:r>
-              <a:rPr lang="en-US" sz="2400">
+              <a:lnSpc>
+                <a:spcPct val="100000"/>
+              </a:lnSpc>
+              <a:buSzPct val="45000"/>
+              <a:buFont typeface="StarSymbol"/>
+              <a:buChar char="l"/>
+            </a:pPr>
+            <a:r>
+              <a:rPr lang="en-US" sz="2400" strike="noStrike">
                 <a:latin typeface="Arial"/>
               </a:rPr>
               <a:t>Структура</a:t>
@@ -5029,12 +5178,15 @@
           </a:p>
           <a:p>
             <a:pPr>
-              <a:buSzPct val="45000"/>
-              <a:buFont typeface="StarSymbol"/>
-              <a:buChar char=""/>
-            </a:pPr>
-            <a:r>
-              <a:rPr lang="en-US" sz="2400">
+              <a:lnSpc>
+                <a:spcPct val="100000"/>
+              </a:lnSpc>
+              <a:buSzPct val="45000"/>
+              <a:buFont typeface="StarSymbol"/>
+              <a:buChar char="l"/>
+            </a:pPr>
+            <a:r>
+              <a:rPr lang="en-US" sz="2400" strike="noStrike">
                 <a:latin typeface="Arial"/>
               </a:rPr>
               <a:t>Помощни програми</a:t>
@@ -5101,7 +5253,7 @@
         <p:spPr>
           <a:xfrm>
             <a:off x="897120" y="1161000"/>
-            <a:ext cx="7770960" cy="1468440"/>
+            <a:ext cx="7770600" cy="1468080"/>
           </a:xfrm>
           <a:prstGeom prst="rect">
             <a:avLst/>
@@ -5152,7 +5304,7 @@
         <p:spPr>
           <a:xfrm>
             <a:off x="2172960" y="2743200"/>
-            <a:ext cx="5599440" cy="2882160"/>
+            <a:ext cx="5599080" cy="2881800"/>
           </a:xfrm>
           <a:prstGeom prst="rect">
             <a:avLst/>
@@ -5220,7 +5372,7 @@
         <p:spPr>
           <a:xfrm>
             <a:off x="897120" y="1399320"/>
-            <a:ext cx="7770960" cy="1468440"/>
+            <a:ext cx="7770600" cy="1468080"/>
           </a:xfrm>
           <a:prstGeom prst="rect">
             <a:avLst/>
@@ -5260,14 +5412,14 @@
       </p:sp>
       <p:sp>
         <p:nvSpPr>
-          <p:cNvPr id="82" name="TextShape 2"/>
-          <p:cNvSpPr txBox="1"/>
+          <p:cNvPr id="82" name="CustomShape 2"/>
+          <p:cNvSpPr/>
           <p:nvPr/>
         </p:nvSpPr>
         <p:spPr>
           <a:xfrm>
             <a:off x="1371600" y="3402360"/>
-            <a:ext cx="6639120" cy="1901160"/>
+            <a:ext cx="6638760" cy="1900800"/>
           </a:xfrm>
           <a:prstGeom prst="rect">
             <a:avLst/>
@@ -5277,16 +5429,25 @@
             <a:noFill/>
           </a:ln>
         </p:spPr>
+        <p:style>
+          <a:lnRef idx="0"/>
+          <a:fillRef idx="0"/>
+          <a:effectRef idx="0"/>
+          <a:fontRef idx="minor"/>
+        </p:style>
         <p:txBody>
           <a:bodyPr lIns="90000" rIns="90000" tIns="45000" bIns="45000"/>
           <a:p>
             <a:pPr>
-              <a:buSzPct val="45000"/>
-              <a:buFont typeface="StarSymbol"/>
-              <a:buChar char=""/>
-            </a:pPr>
-            <a:r>
-              <a:rPr lang="en-US" sz="2400">
+              <a:lnSpc>
+                <a:spcPct val="100000"/>
+              </a:lnSpc>
+              <a:buSzPct val="45000"/>
+              <a:buFont typeface="StarSymbol"/>
+              <a:buChar char="l"/>
+            </a:pPr>
+            <a:r>
+              <a:rPr lang="en-US" sz="2400" strike="noStrike">
                 <a:latin typeface="Arial"/>
               </a:rPr>
               <a:t>Определя структурата и съдържанието</a:t>
@@ -5295,12 +5456,15 @@
           </a:p>
           <a:p>
             <a:pPr>
-              <a:buSzPct val="45000"/>
-              <a:buFont typeface="StarSymbol"/>
-              <a:buChar char=""/>
-            </a:pPr>
-            <a:r>
-              <a:rPr lang="en-US" sz="2400">
+              <a:lnSpc>
+                <a:spcPct val="100000"/>
+              </a:lnSpc>
+              <a:buSzPct val="45000"/>
+              <a:buFont typeface="StarSymbol"/>
+              <a:buChar char="l"/>
+            </a:pPr>
+            <a:r>
+              <a:rPr lang="en-US" sz="2400" strike="noStrike">
                 <a:latin typeface="Arial"/>
               </a:rPr>
               <a:t>Поддържа основния UI:</a:t>
@@ -5309,12 +5473,15 @@
           </a:p>
           <a:p>
             <a:pPr>
-              <a:buSzPct val="45000"/>
-              <a:buFont typeface="StarSymbol"/>
-              <a:buChar char=""/>
-            </a:pPr>
-            <a:r>
-              <a:rPr lang="en-US" sz="2400">
+              <a:lnSpc>
+                <a:spcPct val="100000"/>
+              </a:lnSpc>
+              <a:buSzPct val="45000"/>
+              <a:buFont typeface="StarSymbol"/>
+              <a:buChar char="l"/>
+            </a:pPr>
+            <a:r>
+              <a:rPr lang="en-US" sz="2400" strike="noStrike">
                 <a:latin typeface="Arial"/>
               </a:rPr>
               <a:t>Текст, Изобрежения, Аудио, Видео, Линкове</a:t>
@@ -5323,12 +5490,15 @@
           </a:p>
           <a:p>
             <a:pPr>
-              <a:buSzPct val="45000"/>
-              <a:buFont typeface="StarSymbol"/>
-              <a:buChar char=""/>
-            </a:pPr>
-            <a:r>
-              <a:rPr lang="en-US" sz="2400">
+              <a:lnSpc>
+                <a:spcPct val="100000"/>
+              </a:lnSpc>
+              <a:buSzPct val="45000"/>
+              <a:buFont typeface="StarSymbol"/>
+              <a:buChar char="l"/>
+            </a:pPr>
+            <a:r>
+              <a:rPr lang="en-US" sz="2400" strike="noStrike">
                 <a:latin typeface="Arial"/>
               </a:rPr>
               <a:t>Бутони, Форми, Списъци, Таблици</a:t>
@@ -5395,7 +5565,7 @@
         <p:spPr>
           <a:xfrm>
             <a:off x="805680" y="1666080"/>
-            <a:ext cx="7770960" cy="1468440"/>
+            <a:ext cx="7770600" cy="1468080"/>
           </a:xfrm>
           <a:prstGeom prst="rect">
             <a:avLst/>
@@ -5435,14 +5605,14 @@
       </p:sp>
       <p:sp>
         <p:nvSpPr>
-          <p:cNvPr id="84" name="TextShape 2"/>
-          <p:cNvSpPr txBox="1"/>
+          <p:cNvPr id="84" name="CustomShape 2"/>
+          <p:cNvSpPr/>
           <p:nvPr/>
         </p:nvSpPr>
         <p:spPr>
           <a:xfrm>
             <a:off x="2949840" y="3461760"/>
-            <a:ext cx="3268080" cy="2390400"/>
+            <a:ext cx="3267720" cy="2390040"/>
           </a:xfrm>
           <a:prstGeom prst="rect">
             <a:avLst/>
@@ -5452,16 +5622,25 @@
             <a:noFill/>
           </a:ln>
         </p:spPr>
+        <p:style>
+          <a:lnRef idx="0"/>
+          <a:fillRef idx="0"/>
+          <a:effectRef idx="0"/>
+          <a:fontRef idx="minor"/>
+        </p:style>
         <p:txBody>
           <a:bodyPr lIns="90000" rIns="90000" tIns="45000" bIns="45000"/>
           <a:p>
             <a:pPr>
-              <a:buSzPct val="45000"/>
-              <a:buFont typeface="StarSymbol"/>
-              <a:buChar char=""/>
-            </a:pPr>
-            <a:r>
-              <a:rPr lang="en-US" sz="2400">
+              <a:lnSpc>
+                <a:spcPct val="100000"/>
+              </a:lnSpc>
+              <a:buSzPct val="45000"/>
+              <a:buFont typeface="StarSymbol"/>
+              <a:buChar char="l"/>
+            </a:pPr>
+            <a:r>
+              <a:rPr lang="en-US" sz="2400" strike="noStrike">
                 <a:latin typeface="Arial"/>
               </a:rPr>
               <a:t>Тагове</a:t>
@@ -5470,12 +5649,15 @@
           </a:p>
           <a:p>
             <a:pPr>
-              <a:buSzPct val="45000"/>
-              <a:buFont typeface="StarSymbol"/>
-              <a:buChar char=""/>
-            </a:pPr>
-            <a:r>
-              <a:rPr lang="en-US" sz="2400">
+              <a:lnSpc>
+                <a:spcPct val="100000"/>
+              </a:lnSpc>
+              <a:buSzPct val="45000"/>
+              <a:buFont typeface="StarSymbol"/>
+              <a:buChar char="l"/>
+            </a:pPr>
+            <a:r>
+              <a:rPr lang="en-US" sz="2400" strike="noStrike">
                 <a:latin typeface="Arial"/>
               </a:rPr>
               <a:t>Атрибути</a:t>
@@ -5484,12 +5666,15 @@
           </a:p>
           <a:p>
             <a:pPr>
-              <a:buSzPct val="45000"/>
-              <a:buFont typeface="StarSymbol"/>
-              <a:buChar char=""/>
-            </a:pPr>
-            <a:r>
-              <a:rPr lang="en-US" sz="2400">
+              <a:lnSpc>
+                <a:spcPct val="100000"/>
+              </a:lnSpc>
+              <a:buSzPct val="45000"/>
+              <a:buFont typeface="StarSymbol"/>
+              <a:buChar char="l"/>
+            </a:pPr>
+            <a:r>
+              <a:rPr lang="en-US" sz="2400" strike="noStrike">
                 <a:latin typeface="Arial"/>
               </a:rPr>
               <a:t>Елементи</a:t>
@@ -5498,12 +5683,15 @@
           </a:p>
           <a:p>
             <a:pPr>
-              <a:buSzPct val="45000"/>
-              <a:buFont typeface="StarSymbol"/>
-              <a:buChar char=""/>
-            </a:pPr>
-            <a:r>
-              <a:rPr lang="en-US" sz="2400">
+              <a:lnSpc>
+                <a:spcPct val="100000"/>
+              </a:lnSpc>
+              <a:buSzPct val="45000"/>
+              <a:buFont typeface="StarSymbol"/>
+              <a:buChar char="l"/>
+            </a:pPr>
+            <a:r>
+              <a:rPr lang="en-US" sz="2400" strike="noStrike">
                 <a:latin typeface="Arial"/>
               </a:rPr>
               <a:t>Коментари</a:t>
@@ -5512,12 +5700,15 @@
           </a:p>
           <a:p>
             <a:pPr>
-              <a:buSzPct val="45000"/>
-              <a:buFont typeface="StarSymbol"/>
-              <a:buChar char=""/>
-            </a:pPr>
-            <a:r>
-              <a:rPr lang="en-US" sz="2400">
+              <a:lnSpc>
+                <a:spcPct val="100000"/>
+              </a:lnSpc>
+              <a:buSzPct val="45000"/>
+              <a:buFont typeface="StarSymbol"/>
+              <a:buChar char="l"/>
+            </a:pPr>
+            <a:r>
+              <a:rPr lang="en-US" sz="2400" strike="noStrike">
                 <a:latin typeface="Arial"/>
               </a:rPr>
               <a:t>Специални символи</a:t>
@@ -5584,7 +5775,7 @@
         <p:spPr>
           <a:xfrm>
             <a:off x="805680" y="1666080"/>
-            <a:ext cx="7770960" cy="1468440"/>
+            <a:ext cx="7770600" cy="1468080"/>
           </a:xfrm>
           <a:prstGeom prst="rect">
             <a:avLst/>
@@ -5624,14 +5815,14 @@
       </p:sp>
       <p:sp>
         <p:nvSpPr>
-          <p:cNvPr id="86" name="TextShape 2"/>
-          <p:cNvSpPr txBox="1"/>
+          <p:cNvPr id="86" name="CustomShape 2"/>
+          <p:cNvSpPr/>
           <p:nvPr/>
         </p:nvSpPr>
         <p:spPr>
           <a:xfrm>
             <a:off x="3515400" y="3585240"/>
-            <a:ext cx="1513800" cy="1901160"/>
+            <a:ext cx="1513440" cy="1900800"/>
           </a:xfrm>
           <a:prstGeom prst="rect">
             <a:avLst/>
@@ -5641,16 +5832,25 @@
             <a:noFill/>
           </a:ln>
         </p:spPr>
+        <p:style>
+          <a:lnRef idx="0"/>
+          <a:fillRef idx="0"/>
+          <a:effectRef idx="0"/>
+          <a:fontRef idx="minor"/>
+        </p:style>
         <p:txBody>
           <a:bodyPr lIns="90000" rIns="90000" tIns="45000" bIns="45000"/>
           <a:p>
             <a:pPr>
-              <a:buSzPct val="45000"/>
-              <a:buFont typeface="StarSymbol"/>
-              <a:buChar char=""/>
-            </a:pPr>
-            <a:r>
-              <a:rPr lang="en-US" sz="2400">
+              <a:lnSpc>
+                <a:spcPct val="100000"/>
+              </a:lnSpc>
+              <a:buSzPct val="45000"/>
+              <a:buFont typeface="StarSymbol"/>
+              <a:buChar char="l"/>
+            </a:pPr>
+            <a:r>
+              <a:rPr lang="en-US" sz="2400" strike="noStrike">
                 <a:latin typeface="Arial"/>
               </a:rPr>
               <a:t>Doctype</a:t>
@@ -5659,12 +5859,15 @@
           </a:p>
           <a:p>
             <a:pPr>
-              <a:buSzPct val="45000"/>
-              <a:buFont typeface="StarSymbol"/>
-              <a:buChar char=""/>
-            </a:pPr>
-            <a:r>
-              <a:rPr lang="en-US" sz="2400">
+              <a:lnSpc>
+                <a:spcPct val="100000"/>
+              </a:lnSpc>
+              <a:buSzPct val="45000"/>
+              <a:buFont typeface="StarSymbol"/>
+              <a:buChar char="l"/>
+            </a:pPr>
+            <a:r>
+              <a:rPr lang="en-US" sz="2400" strike="noStrike">
                 <a:latin typeface="Arial"/>
               </a:rPr>
               <a:t>HTML</a:t>
@@ -5673,12 +5876,15 @@
           </a:p>
           <a:p>
             <a:pPr>
-              <a:buSzPct val="45000"/>
-              <a:buFont typeface="StarSymbol"/>
-              <a:buChar char=""/>
-            </a:pPr>
-            <a:r>
-              <a:rPr lang="en-US" sz="2400">
+              <a:lnSpc>
+                <a:spcPct val="100000"/>
+              </a:lnSpc>
+              <a:buSzPct val="45000"/>
+              <a:buFont typeface="StarSymbol"/>
+              <a:buChar char="l"/>
+            </a:pPr>
+            <a:r>
+              <a:rPr lang="en-US" sz="2400" strike="noStrike">
                 <a:latin typeface="Arial"/>
               </a:rPr>
               <a:t>HEAD</a:t>
@@ -5687,12 +5893,15 @@
           </a:p>
           <a:p>
             <a:pPr>
-              <a:buSzPct val="45000"/>
-              <a:buFont typeface="StarSymbol"/>
-              <a:buChar char=""/>
-            </a:pPr>
-            <a:r>
-              <a:rPr lang="en-US" sz="2400">
+              <a:lnSpc>
+                <a:spcPct val="100000"/>
+              </a:lnSpc>
+              <a:buSzPct val="45000"/>
+              <a:buFont typeface="StarSymbol"/>
+              <a:buChar char="l"/>
+            </a:pPr>
+            <a:r>
+              <a:rPr lang="en-US" sz="2400" strike="noStrike">
                 <a:latin typeface="Arial"/>
               </a:rPr>
               <a:t>BODY</a:t>
@@ -5759,7 +5968,7 @@
         <p:spPr>
           <a:xfrm>
             <a:off x="824400" y="2920680"/>
-            <a:ext cx="7770960" cy="1468440"/>
+            <a:ext cx="7770600" cy="1468080"/>
           </a:xfrm>
           <a:prstGeom prst="rect">
             <a:avLst/>
@@ -5855,7 +6064,7 @@
         <p:spPr>
           <a:xfrm>
             <a:off x="792000" y="909000"/>
-            <a:ext cx="7770960" cy="1468440"/>
+            <a:ext cx="7770600" cy="1468080"/>
           </a:xfrm>
           <a:prstGeom prst="rect">
             <a:avLst/>
@@ -5895,14 +6104,14 @@
       </p:sp>
       <p:sp>
         <p:nvSpPr>
-          <p:cNvPr id="89" name="TextShape 2"/>
-          <p:cNvSpPr txBox="1"/>
+          <p:cNvPr id="89" name="CustomShape 2"/>
+          <p:cNvSpPr/>
           <p:nvPr/>
         </p:nvSpPr>
         <p:spPr>
           <a:xfrm>
             <a:off x="1920240" y="2377440"/>
-            <a:ext cx="5870880" cy="4397400"/>
+            <a:ext cx="5870520" cy="4397040"/>
           </a:xfrm>
           <a:prstGeom prst="rect">
             <a:avLst/>
@@ -5912,29 +6121,34 @@
             <a:noFill/>
           </a:ln>
         </p:spPr>
+        <p:style>
+          <a:lnRef idx="0"/>
+          <a:fillRef idx="0"/>
+          <a:effectRef idx="0"/>
+          <a:fontRef idx="minor"/>
+        </p:style>
         <p:txBody>
           <a:bodyPr lIns="90000" rIns="90000" tIns="45000" bIns="45000"/>
           <a:p>
-            <a:pPr>
-              <a:buSzPct val="45000"/>
-              <a:buFont typeface="StarSymbol"/>
-              <a:buChar char=""/>
-            </a:pPr>
-            <a:r>
-              <a:rPr lang="en-US" sz="2400">
+            <a:r>
+              <a:rPr lang="en-US" sz="2400" strike="noStrike">
                 <a:latin typeface="Arial"/>
               </a:rPr>
               <a:t>Форматиране на текст: </a:t>
             </a:r>
-            <a:r>
-              <a:rPr lang="en-US" sz="2400">
-                <a:latin typeface="Arial"/>
-              </a:rPr>
-              <a:t>
-</a:t>
-            </a:r>
-            <a:r>
-              <a:rPr b="1" lang="en-US" sz="1600">
+            <a:endParaRPr/>
+          </a:p>
+          <a:p>
+            <a:pPr>
+              <a:lnSpc>
+                <a:spcPct val="100000"/>
+              </a:lnSpc>
+              <a:buSzPct val="45000"/>
+              <a:buFont typeface="StarSymbol"/>
+              <a:buChar char="l"/>
+            </a:pPr>
+            <a:r>
+              <a:rPr b="1" lang="en-US" sz="1600" strike="noStrike">
                 <a:latin typeface="Arial"/>
               </a:rPr>
               <a:t>&lt;B&gt;, &lt;i&gt;, &lt;U&gt;, &lt;SUP&gt;, &lt;SUB&gt;, &lt;STRONG&gt;, &lt;EM&gt;, &lt;PRE&gt;</a:t>
@@ -5943,25 +6157,32 @@
           </a:p>
           <a:p>
             <a:pPr>
-              <a:buSzPct val="45000"/>
-              <a:buFont typeface="StarSymbol"/>
-              <a:buChar char=""/>
-            </a:pPr>
-            <a:r>
-              <a:rPr lang="en-US" sz="2400">
+              <a:lnSpc>
+                <a:spcPct val="100000"/>
+              </a:lnSpc>
+              <a:buSzPct val="45000"/>
+              <a:buFont typeface="StarSymbol"/>
+              <a:buChar char="l"/>
+            </a:pPr>
+            <a:r>
+              <a:rPr lang="en-US" sz="2400" strike="noStrike">
                 <a:latin typeface="Arial"/>
               </a:rPr>
               <a:t>Линкове</a:t>
             </a:r>
-            <a:r>
-              <a:rPr lang="en-US" sz="2400">
-                <a:latin typeface="Arial"/>
-              </a:rPr>
-              <a:t>
-</a:t>
-            </a:r>
-            <a:r>
-              <a:rPr lang="en-US" sz="1600">
+            <a:endParaRPr/>
+          </a:p>
+          <a:p>
+            <a:pPr>
+              <a:lnSpc>
+                <a:spcPct val="100000"/>
+              </a:lnSpc>
+              <a:buSzPct val="45000"/>
+              <a:buFont typeface="StarSymbol"/>
+              <a:buChar char="l"/>
+            </a:pPr>
+            <a:r>
+              <a:rPr lang="en-US" sz="1600" strike="noStrike">
                 <a:latin typeface="Arial"/>
               </a:rPr>
               <a:t>&lt;A&gt;</a:t>
@@ -5970,12 +6191,15 @@
           </a:p>
           <a:p>
             <a:pPr>
-              <a:buSzPct val="45000"/>
-              <a:buFont typeface="StarSymbol"/>
-              <a:buChar char=""/>
-            </a:pPr>
-            <a:r>
-              <a:rPr lang="en-US" sz="2400">
+              <a:lnSpc>
+                <a:spcPct val="100000"/>
+              </a:lnSpc>
+              <a:buSzPct val="45000"/>
+              <a:buFont typeface="StarSymbol"/>
+              <a:buChar char="l"/>
+            </a:pPr>
+            <a:r>
+              <a:rPr lang="en-US" sz="2400" strike="noStrike">
                 <a:latin typeface="Arial"/>
               </a:rPr>
               <a:t>Картинки</a:t>
@@ -5984,12 +6208,15 @@
           </a:p>
           <a:p>
             <a:pPr>
-              <a:buSzPct val="45000"/>
-              <a:buFont typeface="StarSymbol"/>
-              <a:buChar char=""/>
-            </a:pPr>
-            <a:r>
-              <a:rPr lang="en-US" sz="1600">
+              <a:lnSpc>
+                <a:spcPct val="100000"/>
+              </a:lnSpc>
+              <a:buSzPct val="45000"/>
+              <a:buFont typeface="StarSymbol"/>
+              <a:buChar char="l"/>
+            </a:pPr>
+            <a:r>
+              <a:rPr lang="en-US" sz="1600" strike="noStrike">
                 <a:latin typeface="Arial"/>
               </a:rPr>
               <a:t>&lt;IMG&gt;</a:t>
@@ -5998,25 +6225,32 @@
           </a:p>
           <a:p>
             <a:pPr>
-              <a:buSzPct val="45000"/>
-              <a:buFont typeface="StarSymbol"/>
-              <a:buChar char=""/>
-            </a:pPr>
-            <a:r>
-              <a:rPr lang="en-US" sz="2400">
+              <a:lnSpc>
+                <a:spcPct val="100000"/>
+              </a:lnSpc>
+              <a:buSzPct val="45000"/>
+              <a:buFont typeface="StarSymbol"/>
+              <a:buChar char="l"/>
+            </a:pPr>
+            <a:r>
+              <a:rPr lang="en-US" sz="2400" strike="noStrike">
                 <a:latin typeface="Arial"/>
               </a:rPr>
               <a:t>Заглавия</a:t>
             </a:r>
-            <a:r>
-              <a:rPr lang="en-US" sz="2400">
-                <a:latin typeface="Arial"/>
-              </a:rPr>
-              <a:t>
-</a:t>
-            </a:r>
-            <a:r>
-              <a:rPr lang="en-US" sz="1600">
+            <a:endParaRPr/>
+          </a:p>
+          <a:p>
+            <a:pPr>
+              <a:lnSpc>
+                <a:spcPct val="100000"/>
+              </a:lnSpc>
+              <a:buSzPct val="45000"/>
+              <a:buFont typeface="StarSymbol"/>
+              <a:buChar char="l"/>
+            </a:pPr>
+            <a:r>
+              <a:rPr lang="en-US" sz="1600" strike="noStrike">
                 <a:latin typeface="Arial"/>
               </a:rPr>
               <a:t>&lt;H1&gt;, &lt;H2&gt;, &lt;H3&gt;, &lt;H4&gt;</a:t>
@@ -6025,25 +6259,32 @@
           </a:p>
           <a:p>
             <a:pPr>
-              <a:buSzPct val="45000"/>
-              <a:buFont typeface="StarSymbol"/>
-              <a:buChar char=""/>
-            </a:pPr>
-            <a:r>
-              <a:rPr lang="en-US" sz="2400">
+              <a:lnSpc>
+                <a:spcPct val="100000"/>
+              </a:lnSpc>
+              <a:buSzPct val="45000"/>
+              <a:buFont typeface="StarSymbol"/>
+              <a:buChar char="l"/>
+            </a:pPr>
+            <a:r>
+              <a:rPr lang="en-US" sz="2400" strike="noStrike">
                 <a:latin typeface="Arial"/>
               </a:rPr>
               <a:t>Параграфи</a:t>
             </a:r>
-            <a:r>
-              <a:rPr lang="en-US" sz="2400">
-                <a:latin typeface="Arial"/>
-              </a:rPr>
-              <a:t>
-</a:t>
-            </a:r>
-            <a:r>
-              <a:rPr lang="en-US" sz="1600">
+            <a:endParaRPr/>
+          </a:p>
+          <a:p>
+            <a:pPr>
+              <a:lnSpc>
+                <a:spcPct val="100000"/>
+              </a:lnSpc>
+              <a:buSzPct val="45000"/>
+              <a:buFont typeface="StarSymbol"/>
+              <a:buChar char="l"/>
+            </a:pPr>
+            <a:r>
+              <a:rPr lang="en-US" sz="1600" strike="noStrike">
                 <a:latin typeface="Arial"/>
               </a:rPr>
               <a:t>&lt;P&gt;</a:t>
@@ -6052,25 +6293,32 @@
           </a:p>
           <a:p>
             <a:pPr>
-              <a:buSzPct val="45000"/>
-              <a:buFont typeface="StarSymbol"/>
-              <a:buChar char=""/>
-            </a:pPr>
-            <a:r>
-              <a:rPr lang="en-US" sz="2400">
+              <a:lnSpc>
+                <a:spcPct val="100000"/>
+              </a:lnSpc>
+              <a:buSzPct val="45000"/>
+              <a:buFont typeface="StarSymbol"/>
+              <a:buChar char="l"/>
+            </a:pPr>
+            <a:r>
+              <a:rPr lang="en-US" sz="2400" strike="noStrike">
                 <a:latin typeface="Arial"/>
               </a:rPr>
               <a:t>Секции</a:t>
             </a:r>
-            <a:r>
-              <a:rPr lang="en-US" sz="2400">
-                <a:latin typeface="Arial"/>
-              </a:rPr>
-              <a:t>
-</a:t>
-            </a:r>
-            <a:r>
-              <a:rPr lang="en-US" sz="1600">
+            <a:endParaRPr/>
+          </a:p>
+          <a:p>
+            <a:pPr>
+              <a:lnSpc>
+                <a:spcPct val="100000"/>
+              </a:lnSpc>
+              <a:buSzPct val="45000"/>
+              <a:buFont typeface="StarSymbol"/>
+              <a:buChar char="l"/>
+            </a:pPr>
+            <a:r>
+              <a:rPr lang="en-US" sz="1600" strike="noStrike">
                 <a:latin typeface="Arial"/>
               </a:rPr>
               <a:t>&lt;DIV&gt;, &lt;SPAN&gt; </a:t>

</xml_diff>